<commit_message>
Second slide  content added
</commit_message>
<xml_diff>
--- a/Killer Fish/Killer Robot.pptx
+++ b/Killer Fish/Killer Robot.pptx
@@ -222,7 +222,7 @@
           <a:p>
             <a:fld id="{C8D18E60-4300-4729-A0D7-6AB984C3922D}" type="datetimeFigureOut">
               <a:rPr lang="en-US" smtClean="0"/>
-              <a:t>11/25/2022</a:t>
+              <a:t>11/26/2022</a:t>
             </a:fld>
             <a:endParaRPr lang="en-US"/>
           </a:p>
@@ -1131,7 +1131,7 @@
             <a:fld id="{53074F12-AA26-4AC8-9962-C36BB8F32554}" type="datetimeFigureOut">
               <a:rPr lang="en-US" smtClean="0"/>
               <a:pPr/>
-              <a:t>11/25/2022</a:t>
+              <a:t>11/26/2022</a:t>
             </a:fld>
             <a:endParaRPr lang="en-US"/>
           </a:p>
@@ -1385,7 +1385,7 @@
             <a:fld id="{53074F12-AA26-4AC8-9962-C36BB8F32554}" type="datetimeFigureOut">
               <a:rPr lang="en-US" smtClean="0"/>
               <a:pPr/>
-              <a:t>11/25/2022</a:t>
+              <a:t>11/26/2022</a:t>
             </a:fld>
             <a:endParaRPr lang="en-US"/>
           </a:p>
@@ -1555,7 +1555,7 @@
             <a:fld id="{53074F12-AA26-4AC8-9962-C36BB8F32554}" type="datetimeFigureOut">
               <a:rPr lang="en-US" smtClean="0"/>
               <a:pPr/>
-              <a:t>11/25/2022</a:t>
+              <a:t>11/26/2022</a:t>
             </a:fld>
             <a:endParaRPr lang="en-US"/>
           </a:p>
@@ -1735,7 +1735,7 @@
             <a:fld id="{53074F12-AA26-4AC8-9962-C36BB8F32554}" type="datetimeFigureOut">
               <a:rPr lang="en-US" smtClean="0"/>
               <a:pPr/>
-              <a:t>11/25/2022</a:t>
+              <a:t>11/26/2022</a:t>
             </a:fld>
             <a:endParaRPr lang="en-US"/>
           </a:p>
@@ -2027,7 +2027,7 @@
             <a:fld id="{53074F12-AA26-4AC8-9962-C36BB8F32554}" type="datetimeFigureOut">
               <a:rPr lang="en-US" smtClean="0"/>
               <a:pPr/>
-              <a:t>11/25/2022</a:t>
+              <a:t>11/26/2022</a:t>
             </a:fld>
             <a:endParaRPr lang="en-US"/>
           </a:p>
@@ -2290,7 +2290,7 @@
             <a:fld id="{53074F12-AA26-4AC8-9962-C36BB8F32554}" type="datetimeFigureOut">
               <a:rPr lang="en-US" smtClean="0"/>
               <a:pPr/>
-              <a:t>11/25/2022</a:t>
+              <a:t>11/26/2022</a:t>
             </a:fld>
             <a:endParaRPr lang="en-US"/>
           </a:p>
@@ -2537,7 +2537,7 @@
             <a:fld id="{53074F12-AA26-4AC8-9962-C36BB8F32554}" type="datetimeFigureOut">
               <a:rPr lang="en-US" smtClean="0"/>
               <a:pPr/>
-              <a:t>11/25/2022</a:t>
+              <a:t>11/26/2022</a:t>
             </a:fld>
             <a:endParaRPr lang="en-US"/>
           </a:p>
@@ -2824,7 +2824,7 @@
             <a:fld id="{53074F12-AA26-4AC8-9962-C36BB8F32554}" type="datetimeFigureOut">
               <a:rPr lang="en-US" smtClean="0"/>
               <a:pPr/>
-              <a:t>11/25/2022</a:t>
+              <a:t>11/26/2022</a:t>
             </a:fld>
             <a:endParaRPr lang="en-US"/>
           </a:p>
@@ -3335,7 +3335,7 @@
             <a:fld id="{53074F12-AA26-4AC8-9962-C36BB8F32554}" type="datetimeFigureOut">
               <a:rPr lang="en-US" smtClean="0"/>
               <a:pPr/>
-              <a:t>11/25/2022</a:t>
+              <a:t>11/26/2022</a:t>
             </a:fld>
             <a:endParaRPr lang="en-US"/>
           </a:p>
@@ -3454,7 +3454,7 @@
             <a:fld id="{53074F12-AA26-4AC8-9962-C36BB8F32554}" type="datetimeFigureOut">
               <a:rPr lang="en-US" smtClean="0"/>
               <a:pPr/>
-              <a:t>11/25/2022</a:t>
+              <a:t>11/26/2022</a:t>
             </a:fld>
             <a:endParaRPr lang="en-US"/>
           </a:p>
@@ -3551,7 +3551,7 @@
             <a:fld id="{53074F12-AA26-4AC8-9962-C36BB8F32554}" type="datetimeFigureOut">
               <a:rPr lang="en-US" smtClean="0"/>
               <a:pPr/>
-              <a:t>11/25/2022</a:t>
+              <a:t>11/26/2022</a:t>
             </a:fld>
             <a:endParaRPr lang="en-US"/>
           </a:p>
@@ -3828,7 +3828,7 @@
             <a:fld id="{53074F12-AA26-4AC8-9962-C36BB8F32554}" type="datetimeFigureOut">
               <a:rPr lang="en-US" smtClean="0"/>
               <a:pPr/>
-              <a:t>11/25/2022</a:t>
+              <a:t>11/26/2022</a:t>
             </a:fld>
             <a:endParaRPr lang="en-US"/>
           </a:p>
@@ -4050,7 +4050,7 @@
             <a:fld id="{53074F12-AA26-4AC8-9962-C36BB8F32554}" type="datetimeFigureOut">
               <a:rPr lang="en-US" smtClean="0"/>
               <a:pPr/>
-              <a:t>11/25/2022</a:t>
+              <a:t>11/26/2022</a:t>
             </a:fld>
             <a:endParaRPr lang="en-US"/>
           </a:p>
@@ -4583,15 +4583,7 @@
                   <a:schemeClr val="bg1"/>
                 </a:solidFill>
               </a:rPr>
-              <a:t>  </a:t>
-            </a:r>
-            <a:r>
-              <a:rPr lang="en-US" dirty="0" smtClean="0">
-                <a:solidFill>
-                  <a:schemeClr val="bg1"/>
-                </a:solidFill>
-              </a:rPr>
-              <a:t>- Roshan </a:t>
+              <a:t>  - Roshan </a:t>
             </a:r>
             <a:r>
               <a:rPr lang="en-US" dirty="0" err="1">
@@ -4694,13 +4686,6 @@
   <p:clrMapOvr>
     <a:masterClrMapping/>
   </p:clrMapOvr>
-  <p:timing>
-    <p:tnLst>
-      <p:par>
-        <p:cTn id="1" dur="indefinite" restart="never" nodeType="tmRoot"/>
-      </p:par>
-    </p:tnLst>
-  </p:timing>
 </p:sld>
 </file>
 
@@ -4744,18 +4729,13 @@
           <a:lstStyle/>
           <a:p>
             <a:r>
-              <a:rPr lang="en-US" sz="4400" cap="none" dirty="0" smtClean="0">
+              <a:rPr lang="en-US" sz="4400" cap="none" dirty="0">
                 <a:solidFill>
                   <a:srgbClr val="4BACC6"/>
                 </a:solidFill>
               </a:rPr>
               <a:t>Main Culprit</a:t>
             </a:r>
-            <a:endParaRPr lang="en-US" sz="4400" cap="none" dirty="0">
-              <a:solidFill>
-                <a:srgbClr val="4BACC6"/>
-              </a:solidFill>
-            </a:endParaRPr>
           </a:p>
         </p:txBody>
       </p:sp>
@@ -4783,7 +4763,7 @@
           <a:p>
             <a:pPr algn="ctr"/>
             <a:r>
-              <a:rPr lang="en-US" sz="3200" b="1" dirty="0" smtClean="0">
+              <a:rPr lang="en-US" sz="3200" b="1" dirty="0">
                 <a:solidFill>
                   <a:schemeClr val="tx1"/>
                 </a:solidFill>
@@ -4795,7 +4775,7 @@
           <a:p>
             <a:pPr algn="ctr"/>
             <a:r>
-              <a:rPr lang="en-US" sz="3200" b="1" dirty="0" smtClean="0">
+              <a:rPr lang="en-US" sz="3200" b="1" dirty="0">
                 <a:solidFill>
                   <a:schemeClr val="tx1"/>
                 </a:solidFill>
@@ -4803,12 +4783,6 @@
               </a:rPr>
               <a:t>Ray Johnson</a:t>
             </a:r>
-            <a:endParaRPr lang="en-US" sz="3200" b="1" dirty="0">
-              <a:solidFill>
-                <a:schemeClr val="tx1"/>
-              </a:solidFill>
-              <a:latin typeface="+mj-lt"/>
-            </a:endParaRPr>
           </a:p>
         </p:txBody>
       </p:sp>
@@ -4852,13 +4826,6 @@
   <p:clrMapOvr>
     <a:masterClrMapping/>
   </p:clrMapOvr>
-  <p:timing>
-    <p:tnLst>
-      <p:par>
-        <p:cTn id="1" dur="indefinite" restart="never" nodeType="tmRoot"/>
-      </p:par>
-    </p:tnLst>
-  </p:timing>
 </p:sld>
 </file>
 
@@ -5045,18 +5012,13 @@
               <a:buNone/>
             </a:pPr>
             <a:r>
-              <a:rPr lang="en-US" sz="2400" dirty="0" smtClean="0">
+              <a:rPr lang="en-US" sz="2400" dirty="0">
                 <a:solidFill>
                   <a:srgbClr val="232D48"/>
                 </a:solidFill>
               </a:rPr>
               <a:t>ACM Code of Conduct</a:t>
             </a:r>
-            <a:endParaRPr lang="en-US" sz="2400" dirty="0">
-              <a:solidFill>
-                <a:srgbClr val="232D48"/>
-              </a:solidFill>
-            </a:endParaRPr>
           </a:p>
         </p:txBody>
       </p:sp>
@@ -5228,18 +5190,13 @@
               <a:buNone/>
             </a:pPr>
             <a:r>
-              <a:rPr lang="en-US" sz="2400" dirty="0" smtClean="0">
+              <a:rPr lang="en-US" sz="2400" dirty="0">
                 <a:solidFill>
                   <a:srgbClr val="232D48"/>
                 </a:solidFill>
               </a:rPr>
               <a:t>BCS Code of Conduct</a:t>
             </a:r>
-            <a:endParaRPr lang="en-US" sz="2400" dirty="0">
-              <a:solidFill>
-                <a:srgbClr val="232D48"/>
-              </a:solidFill>
-            </a:endParaRPr>
           </a:p>
         </p:txBody>
       </p:sp>
@@ -5419,15 +5376,7 @@
                   <a:schemeClr val="bg1"/>
                 </a:solidFill>
               </a:rPr>
-              <a:t>4. Duty to the </a:t>
-            </a:r>
-            <a:r>
-              <a:rPr lang="en-US" sz="2200" dirty="0" smtClean="0">
-                <a:solidFill>
-                  <a:schemeClr val="bg1"/>
-                </a:solidFill>
-              </a:rPr>
-              <a:t>Profession</a:t>
+              <a:t>4. Duty to the Profession</a:t>
             </a:r>
           </a:p>
           <a:p>
@@ -5435,20 +5384,12 @@
               <a:buNone/>
             </a:pPr>
             <a:r>
-              <a:rPr lang="en-US" sz="2200" dirty="0" smtClean="0">
+              <a:rPr lang="en-US" sz="2200" dirty="0">
                 <a:solidFill>
                   <a:schemeClr val="bg1"/>
                 </a:solidFill>
               </a:rPr>
-              <a:t>d) Act </a:t>
-            </a:r>
-            <a:r>
-              <a:rPr lang="en-US" sz="2200" dirty="0">
-                <a:solidFill>
-                  <a:schemeClr val="bg1"/>
-                </a:solidFill>
-              </a:rPr>
-              <a:t>with integrity and respect in your professional relationships with all members </a:t>
+              <a:t>d) Act with integrity and respect in your professional relationships with all members </a:t>
             </a:r>
           </a:p>
         </p:txBody>
@@ -5629,21 +5570,8 @@
                   <a:schemeClr val="bg1"/>
                 </a:solidFill>
               </a:rPr>
-              <a:t>3.6 Create opportunities for members of the organization and group to learn, respect, and be </a:t>
-            </a:r>
-            <a:r>
-              <a:rPr lang="en-US" sz="2200" dirty="0" smtClean="0">
-                <a:solidFill>
-                  <a:schemeClr val="bg1"/>
-                </a:solidFill>
-              </a:rPr>
-              <a:t>accountable.</a:t>
-            </a:r>
-            <a:endParaRPr lang="en-US" sz="2200" dirty="0" smtClean="0">
-              <a:solidFill>
-                <a:schemeClr val="bg1"/>
-              </a:solidFill>
-            </a:endParaRPr>
+              <a:t>3.6 Create opportunities for members of the organization and group to learn, respect, and be accountable.</a:t>
+            </a:r>
           </a:p>
         </p:txBody>
       </p:sp>
@@ -5811,7 +5739,7 @@
               <a:buNone/>
             </a:pPr>
             <a:r>
-              <a:rPr lang="en-US" sz="4000" b="1" dirty="0" smtClean="0"/>
+              <a:rPr lang="en-US" sz="4000" b="1" dirty="0"/>
               <a:t>Crime</a:t>
             </a:r>
           </a:p>
@@ -5820,22 +5748,13 @@
               <a:buNone/>
             </a:pPr>
             <a:r>
-              <a:rPr lang="en-US" sz="1800" dirty="0" smtClean="0"/>
+              <a:rPr lang="en-US" sz="1800" dirty="0"/>
               <a:t>	</a:t>
             </a:r>
             <a:r>
-              <a:rPr lang="en-US" sz="2400" dirty="0" smtClean="0"/>
-              <a:t>Bringing </a:t>
-            </a:r>
-            <a:r>
               <a:rPr lang="en-US" sz="2400" dirty="0"/>
-              <a:t>emotional and personal feud into a professional </a:t>
-            </a:r>
-            <a:r>
-              <a:rPr lang="en-US" sz="2400" dirty="0" smtClean="0"/>
-              <a:t>environment.</a:t>
-            </a:r>
-            <a:endParaRPr lang="en-US" sz="2400" dirty="0"/>
+              <a:t>Bringing emotional and personal feud into a professional environment.</a:t>
+            </a:r>
           </a:p>
           <a:p>
             <a:pPr marL="0" indent="0">
@@ -5901,18 +5820,13 @@
           <a:lstStyle/>
           <a:p>
             <a:r>
-              <a:rPr lang="en-US" b="0" dirty="0" smtClean="0">
+              <a:rPr lang="en-US" b="0" dirty="0">
                 <a:solidFill>
                   <a:srgbClr val="232D48"/>
                 </a:solidFill>
               </a:rPr>
               <a:t>ACM Code of Conduct</a:t>
             </a:r>
-            <a:endParaRPr lang="en-US" b="0" dirty="0">
-              <a:solidFill>
-                <a:srgbClr val="232D48"/>
-              </a:solidFill>
-            </a:endParaRPr>
           </a:p>
         </p:txBody>
       </p:sp>
@@ -5957,11 +5871,6 @@
               </a:rPr>
               <a:t>1.1 Contribute to society and to human well-being, acknowledging that all people are stakeholders in computing.</a:t>
             </a:r>
-            <a:endParaRPr lang="en-US" dirty="0" smtClean="0">
-              <a:solidFill>
-                <a:schemeClr val="bg1"/>
-              </a:solidFill>
-            </a:endParaRPr>
           </a:p>
         </p:txBody>
       </p:sp>
@@ -5993,18 +5902,13 @@
           <a:lstStyle/>
           <a:p>
             <a:r>
-              <a:rPr lang="en-US" b="0" dirty="0" smtClean="0">
+              <a:rPr lang="en-US" b="0" dirty="0">
                 <a:solidFill>
                   <a:srgbClr val="232D48"/>
                 </a:solidFill>
               </a:rPr>
               <a:t>BCS Code of Conduct</a:t>
             </a:r>
-            <a:endParaRPr lang="en-US" b="0" dirty="0">
-              <a:solidFill>
-                <a:srgbClr val="232D48"/>
-              </a:solidFill>
-            </a:endParaRPr>
           </a:p>
         </p:txBody>
       </p:sp>
@@ -6042,52 +5946,26 @@
               <a:buNone/>
             </a:pPr>
             <a:r>
-              <a:rPr lang="en-US" dirty="0" smtClean="0">
+              <a:rPr lang="en-US" dirty="0">
                 <a:solidFill>
                   <a:schemeClr val="bg1"/>
                 </a:solidFill>
               </a:rPr>
-              <a:t>4. Duty </a:t>
-            </a:r>
-            <a:r>
-              <a:rPr lang="en-US" dirty="0">
-                <a:solidFill>
-                  <a:schemeClr val="bg1"/>
-                </a:solidFill>
-              </a:rPr>
-              <a:t>to the Profession</a:t>
-            </a:r>
-            <a:endParaRPr lang="en-US" dirty="0" smtClean="0">
-              <a:solidFill>
-                <a:schemeClr val="bg1"/>
-              </a:solidFill>
-            </a:endParaRPr>
+              <a:t>4. Duty to the Profession</a:t>
+            </a:r>
           </a:p>
           <a:p>
             <a:pPr marL="0" indent="0">
               <a:buNone/>
             </a:pPr>
             <a:r>
-              <a:rPr lang="en-US" dirty="0" smtClean="0">
+              <a:rPr lang="en-US" dirty="0">
                 <a:solidFill>
                   <a:schemeClr val="bg1"/>
                 </a:solidFill>
               </a:rPr>
-              <a:t>f) Encourage </a:t>
-            </a:r>
-            <a:r>
-              <a:rPr lang="en-US" dirty="0">
-                <a:solidFill>
-                  <a:schemeClr val="bg1"/>
-                </a:solidFill>
-              </a:rPr>
-              <a:t>and support fellow members in their professional development.</a:t>
-            </a:r>
-            <a:endParaRPr lang="en-US" dirty="0">
-              <a:solidFill>
-                <a:schemeClr val="bg1"/>
-              </a:solidFill>
-            </a:endParaRPr>
+              <a:t>f) Encourage and support fellow members in their professional development.</a:t>
+            </a:r>
           </a:p>
         </p:txBody>
       </p:sp>
@@ -6255,7 +6133,7 @@
               <a:buNone/>
             </a:pPr>
             <a:r>
-              <a:rPr lang="en-US" sz="4000" b="1" dirty="0" smtClean="0"/>
+              <a:rPr lang="en-US" sz="4000" b="1" dirty="0"/>
               <a:t>Crime</a:t>
             </a:r>
           </a:p>
@@ -6264,14 +6142,13 @@
               <a:buNone/>
             </a:pPr>
             <a:r>
-              <a:rPr lang="en-US" sz="1800" dirty="0" smtClean="0"/>
+              <a:rPr lang="en-US" sz="1800" dirty="0"/>
               <a:t>	</a:t>
             </a:r>
             <a:r>
-              <a:rPr lang="en-US" sz="2400" dirty="0" smtClean="0"/>
+              <a:rPr lang="en-US" sz="2400" dirty="0"/>
               <a:t>Placing a lot of pressure on team members.</a:t>
             </a:r>
-            <a:endParaRPr lang="en-US" sz="2400" dirty="0"/>
           </a:p>
           <a:p>
             <a:pPr marL="0" indent="0">
@@ -6291,13 +6168,6 @@
   <p:clrMapOvr>
     <a:masterClrMapping/>
   </p:clrMapOvr>
-  <p:timing>
-    <p:tnLst>
-      <p:par>
-        <p:cTn id="1" dur="indefinite" restart="never" nodeType="tmRoot"/>
-      </p:par>
-    </p:tnLst>
-  </p:timing>
 </p:sld>
 </file>
 
@@ -6484,18 +6354,13 @@
               <a:buNone/>
             </a:pPr>
             <a:r>
-              <a:rPr lang="en-US" sz="2400" dirty="0" smtClean="0">
+              <a:rPr lang="en-US" sz="2400" dirty="0">
                 <a:solidFill>
                   <a:srgbClr val="232D48"/>
                 </a:solidFill>
               </a:rPr>
               <a:t>ACM Code of Conduct</a:t>
             </a:r>
-            <a:endParaRPr lang="en-US" sz="2400" dirty="0">
-              <a:solidFill>
-                <a:srgbClr val="232D48"/>
-              </a:solidFill>
-            </a:endParaRPr>
           </a:p>
         </p:txBody>
       </p:sp>
@@ -6677,11 +6542,6 @@
               </a:rPr>
               <a:t>2.2 Maintain high standards of professional competence, conduct, and ethical practice.</a:t>
             </a:r>
-            <a:endParaRPr lang="en-US" sz="2400" dirty="0" smtClean="0">
-              <a:solidFill>
-                <a:schemeClr val="bg1"/>
-              </a:solidFill>
-            </a:endParaRPr>
           </a:p>
         </p:txBody>
       </p:sp>
@@ -6853,18 +6713,13 @@
               <a:buNone/>
             </a:pPr>
             <a:r>
-              <a:rPr lang="en-US" sz="2400" dirty="0" smtClean="0">
+              <a:rPr lang="en-US" sz="2400" dirty="0">
                 <a:solidFill>
                   <a:srgbClr val="232D48"/>
                 </a:solidFill>
               </a:rPr>
               <a:t>BCS Code of Conduct</a:t>
             </a:r>
-            <a:endParaRPr lang="en-US" sz="2400" dirty="0">
-              <a:solidFill>
-                <a:srgbClr val="232D48"/>
-              </a:solidFill>
-            </a:endParaRPr>
           </a:p>
         </p:txBody>
       </p:sp>
@@ -7210,7 +7065,7 @@
               <a:buNone/>
             </a:pPr>
             <a:r>
-              <a:rPr lang="en-US" sz="4000" b="1" dirty="0" smtClean="0"/>
+              <a:rPr lang="en-US" sz="4000" b="1" dirty="0"/>
               <a:t>Crime</a:t>
             </a:r>
           </a:p>
@@ -7219,25 +7074,20 @@
               <a:buNone/>
             </a:pPr>
             <a:r>
-              <a:rPr lang="en-US" sz="1800" dirty="0" smtClean="0"/>
+              <a:rPr lang="en-US" sz="1800" dirty="0"/>
               <a:t>	</a:t>
             </a:r>
             <a:r>
               <a:rPr lang="en-US" sz="2400" dirty="0"/>
-              <a:t>Wanted his subordinates to cut </a:t>
-            </a:r>
-            <a:r>
-              <a:rPr lang="en-US" sz="2400" dirty="0" smtClean="0"/>
-              <a:t>corners.</a:t>
-            </a:r>
-            <a:endParaRPr lang="en-US" sz="2400" dirty="0"/>
+              <a:t>Wanted his subordinates to cut corners.</a:t>
+            </a:r>
           </a:p>
           <a:p>
             <a:pPr marL="0" indent="0">
               <a:buNone/>
             </a:pPr>
             <a:r>
-              <a:rPr lang="en-GB" sz="2400" dirty="0" smtClean="0"/>
+              <a:rPr lang="en-GB" sz="2400" dirty="0"/>
               <a:t>.</a:t>
             </a:r>
             <a:endParaRPr lang="en-US" sz="2400" dirty="0"/>
@@ -7440,18 +7290,13 @@
               <a:buNone/>
             </a:pPr>
             <a:r>
-              <a:rPr lang="en-US" sz="2400" dirty="0" smtClean="0">
+              <a:rPr lang="en-US" sz="2400" dirty="0">
                 <a:solidFill>
                   <a:srgbClr val="232D48"/>
                 </a:solidFill>
               </a:rPr>
               <a:t>ACM Code of Conduct</a:t>
             </a:r>
-            <a:endParaRPr lang="en-US" sz="2400" dirty="0">
-              <a:solidFill>
-                <a:srgbClr val="232D48"/>
-              </a:solidFill>
-            </a:endParaRPr>
           </a:p>
         </p:txBody>
       </p:sp>
@@ -7626,26 +7471,13 @@
               <a:buNone/>
             </a:pPr>
             <a:r>
-              <a:rPr lang="en-US" sz="2400" dirty="0" smtClean="0">
+              <a:rPr lang="en-US" sz="2400" dirty="0">
                 <a:solidFill>
                   <a:schemeClr val="bg1"/>
                 </a:solidFill>
               </a:rPr>
-              <a:t>2.4 </a:t>
-            </a:r>
-            <a:r>
-              <a:rPr lang="en-US" sz="2400" dirty="0">
-                <a:solidFill>
-                  <a:schemeClr val="bg1"/>
-                </a:solidFill>
-              </a:rPr>
-              <a:t>Accept and provide appropriate professional review.</a:t>
-            </a:r>
-            <a:endParaRPr lang="en-US" sz="2400" dirty="0" smtClean="0">
-              <a:solidFill>
-                <a:schemeClr val="bg1"/>
-              </a:solidFill>
-            </a:endParaRPr>
+              <a:t>2.4 Accept and provide appropriate professional review.</a:t>
+            </a:r>
           </a:p>
         </p:txBody>
       </p:sp>
@@ -7817,18 +7649,13 @@
               <a:buNone/>
             </a:pPr>
             <a:r>
-              <a:rPr lang="en-US" sz="2400" dirty="0" smtClean="0">
+              <a:rPr lang="en-US" sz="2400" dirty="0">
                 <a:solidFill>
                   <a:srgbClr val="232D48"/>
                 </a:solidFill>
               </a:rPr>
               <a:t>BCS Code of Conduct</a:t>
             </a:r>
-            <a:endParaRPr lang="en-US" sz="2400" dirty="0">
-              <a:solidFill>
-                <a:srgbClr val="232D48"/>
-              </a:solidFill>
-            </a:endParaRPr>
           </a:p>
         </p:txBody>
       </p:sp>
@@ -8010,47 +7837,18 @@
               </a:rPr>
               <a:t>2. Professional Competence and Integrity</a:t>
             </a:r>
-            <a:endParaRPr lang="en-US" sz="2400" dirty="0" smtClean="0">
-              <a:solidFill>
-                <a:schemeClr val="bg1"/>
-              </a:solidFill>
-            </a:endParaRPr>
           </a:p>
           <a:p>
             <a:pPr marL="0" indent="0" algn="ctr">
               <a:buNone/>
             </a:pPr>
             <a:r>
-              <a:rPr lang="en-US" sz="2400" dirty="0" smtClean="0">
+              <a:rPr lang="en-US" sz="2400" dirty="0">
                 <a:solidFill>
                   <a:schemeClr val="bg1"/>
                 </a:solidFill>
               </a:rPr>
-              <a:t>g) </a:t>
-            </a:r>
-            <a:r>
-              <a:rPr lang="en-US" sz="2400" dirty="0">
-                <a:solidFill>
-                  <a:schemeClr val="bg1"/>
-                </a:solidFill>
-              </a:rPr>
-              <a:t>R</a:t>
-            </a:r>
-            <a:r>
-              <a:rPr lang="en-US" sz="2400" dirty="0" smtClean="0">
-                <a:solidFill>
-                  <a:schemeClr val="bg1"/>
-                </a:solidFill>
-              </a:rPr>
-              <a:t>eject </a:t>
-            </a:r>
-            <a:r>
-              <a:rPr lang="en-US" sz="2400" dirty="0">
-                <a:solidFill>
-                  <a:schemeClr val="bg1"/>
-                </a:solidFill>
-              </a:rPr>
-              <a:t>and will not make any offer of bribery or unethical inducement. </a:t>
+              <a:t>g) Reject and will not make any offer of bribery or unethical inducement. </a:t>
             </a:r>
           </a:p>
         </p:txBody>
@@ -8219,7 +8017,7 @@
               <a:buNone/>
             </a:pPr>
             <a:r>
-              <a:rPr lang="en-US" sz="4000" b="1" dirty="0" smtClean="0"/>
+              <a:rPr lang="en-US" sz="4000" b="1" dirty="0"/>
               <a:t>Crime</a:t>
             </a:r>
           </a:p>
@@ -8228,14 +8026,13 @@
               <a:buNone/>
             </a:pPr>
             <a:r>
-              <a:rPr lang="en-US" sz="1800" dirty="0" smtClean="0"/>
+              <a:rPr lang="en-US" sz="1800" dirty="0"/>
               <a:t>	</a:t>
             </a:r>
             <a:r>
-              <a:rPr lang="en-US" sz="2400" dirty="0" smtClean="0"/>
+              <a:rPr lang="en-US" sz="2400" dirty="0"/>
               <a:t>Manipulated Cindy to perform fake test on Samuel’s software.</a:t>
             </a:r>
-            <a:endParaRPr lang="en-US" sz="2400" dirty="0"/>
           </a:p>
           <a:p>
             <a:pPr marL="0" indent="0">
@@ -8441,18 +8238,13 @@
               <a:buNone/>
             </a:pPr>
             <a:r>
-              <a:rPr lang="en-US" sz="2400" dirty="0" smtClean="0">
+              <a:rPr lang="en-US" sz="2400" dirty="0">
                 <a:solidFill>
                   <a:srgbClr val="232D48"/>
                 </a:solidFill>
               </a:rPr>
               <a:t>ACM Code of Conduct</a:t>
             </a:r>
-            <a:endParaRPr lang="en-US" sz="2400" dirty="0">
-              <a:solidFill>
-                <a:srgbClr val="232D48"/>
-              </a:solidFill>
-            </a:endParaRPr>
           </a:p>
         </p:txBody>
       </p:sp>
@@ -8632,29 +8424,8 @@
                   <a:schemeClr val="bg1"/>
                 </a:solidFill>
               </a:rPr>
-              <a:t>2.1 Strive to achieve the highest quality in </a:t>
-            </a:r>
-            <a:r>
-              <a:rPr lang="en-US" sz="2400" dirty="0" smtClean="0">
-                <a:solidFill>
-                  <a:schemeClr val="bg1"/>
-                </a:solidFill>
-              </a:rPr>
-              <a:t>professional </a:t>
-            </a:r>
-            <a:r>
-              <a:rPr lang="en-US" sz="2400" dirty="0">
-                <a:solidFill>
-                  <a:schemeClr val="bg1"/>
-                </a:solidFill>
-              </a:rPr>
-              <a:t>work.</a:t>
-            </a:r>
-            <a:endParaRPr lang="en-US" sz="2400" dirty="0" smtClean="0">
-              <a:solidFill>
-                <a:schemeClr val="bg1"/>
-              </a:solidFill>
-            </a:endParaRPr>
+              <a:t>2.1 Strive to achieve the highest quality in professional work.</a:t>
+            </a:r>
           </a:p>
         </p:txBody>
       </p:sp>
@@ -8826,18 +8597,13 @@
               <a:buNone/>
             </a:pPr>
             <a:r>
-              <a:rPr lang="en-US" sz="2400" dirty="0" smtClean="0">
+              <a:rPr lang="en-US" sz="2400" dirty="0">
                 <a:solidFill>
                   <a:srgbClr val="232D48"/>
                 </a:solidFill>
               </a:rPr>
               <a:t>BCS Code of Conduct</a:t>
             </a:r>
-            <a:endParaRPr lang="en-US" sz="2400" dirty="0">
-              <a:solidFill>
-                <a:srgbClr val="232D48"/>
-              </a:solidFill>
-            </a:endParaRPr>
           </a:p>
         </p:txBody>
       </p:sp>
@@ -9019,45 +8785,19 @@
               </a:rPr>
               <a:t>3. Duty to Relevant Authority </a:t>
             </a:r>
-            <a:endParaRPr lang="en-US" sz="2400" dirty="0" smtClean="0">
-              <a:solidFill>
-                <a:schemeClr val="bg1"/>
-              </a:solidFill>
-            </a:endParaRPr>
           </a:p>
           <a:p>
             <a:pPr marL="0" indent="0" algn="ctr">
               <a:buNone/>
             </a:pPr>
             <a:r>
-              <a:rPr lang="en-US" sz="2400" dirty="0" smtClean="0">
+              <a:rPr lang="en-US" sz="2400" dirty="0">
                 <a:solidFill>
                   <a:schemeClr val="bg1"/>
                 </a:solidFill>
               </a:rPr>
-              <a:t>g) Carry </a:t>
-            </a:r>
-            <a:r>
-              <a:rPr lang="en-US" sz="2400" dirty="0">
-                <a:solidFill>
-                  <a:schemeClr val="bg1"/>
-                </a:solidFill>
-              </a:rPr>
-              <a:t>out your professional responsibilities with due care and </a:t>
-            </a:r>
-            <a:r>
-              <a:rPr lang="en-US" sz="2400" dirty="0" smtClean="0">
-                <a:solidFill>
-                  <a:schemeClr val="bg1"/>
-                </a:solidFill>
-              </a:rPr>
-              <a:t>diligence.</a:t>
-            </a:r>
-            <a:endParaRPr lang="en-US" sz="2400" dirty="0">
-              <a:solidFill>
-                <a:schemeClr val="bg1"/>
-              </a:solidFill>
-            </a:endParaRPr>
+              <a:t>g) Carry out your professional responsibilities with due care and diligence.</a:t>
+            </a:r>
           </a:p>
         </p:txBody>
       </p:sp>
@@ -9225,7 +8965,7 @@
               <a:buNone/>
             </a:pPr>
             <a:r>
-              <a:rPr lang="en-US" sz="4000" b="1" dirty="0" smtClean="0"/>
+              <a:rPr lang="en-US" sz="4000" b="1" dirty="0"/>
               <a:t>Crime</a:t>
             </a:r>
           </a:p>
@@ -9234,24 +8974,12 @@
               <a:buNone/>
             </a:pPr>
             <a:r>
-              <a:rPr lang="en-US" sz="1800" dirty="0" smtClean="0"/>
+              <a:rPr lang="en-US" sz="1800" dirty="0"/>
               <a:t>	</a:t>
             </a:r>
             <a:r>
               <a:rPr lang="en-GB" sz="2400" dirty="0"/>
-              <a:t>G</a:t>
-            </a:r>
-            <a:r>
-              <a:rPr lang="en-GB" sz="2400" dirty="0" smtClean="0"/>
-              <a:t>etting </a:t>
-            </a:r>
-            <a:r>
-              <a:rPr lang="en-GB" sz="2400" dirty="0"/>
-              <a:t>flawed software out the door to customers on </a:t>
-            </a:r>
-            <a:r>
-              <a:rPr lang="en-GB" sz="2400" dirty="0" smtClean="0"/>
-              <a:t>time.</a:t>
+              <a:t>Getting flawed software out the door to customers on time.</a:t>
             </a:r>
             <a:endParaRPr lang="en-US" sz="2400" dirty="0"/>
           </a:p>
@@ -9299,10 +9027,16 @@
         </p:nvSpPr>
         <p:spPr/>
         <p:txBody>
-          <a:bodyPr/>
+          <a:bodyPr>
+            <a:noAutofit/>
+          </a:bodyPr>
           <a:lstStyle/>
           <a:p>
-            <a:endParaRPr lang="en-US"/>
+            <a:r>
+              <a:rPr lang="en-GB" sz="4400" dirty="0"/>
+              <a:t>Outline</a:t>
+            </a:r>
+            <a:endParaRPr lang="en-US" sz="4400" dirty="0"/>
           </a:p>
         </p:txBody>
       </p:sp>
@@ -9316,12 +9050,81 @@
             <p:ph idx="1"/>
           </p:nvPr>
         </p:nvSpPr>
-        <p:spPr/>
-        <p:txBody>
-          <a:bodyPr/>
+        <p:spPr>
+          <a:xfrm>
+            <a:off x="296260" y="1197405"/>
+            <a:ext cx="6108200" cy="3817625"/>
+          </a:xfrm>
+        </p:spPr>
+        <p:txBody>
+          <a:bodyPr>
+            <a:normAutofit/>
+          </a:bodyPr>
           <a:lstStyle/>
           <a:p>
-            <a:endParaRPr lang="en-US"/>
+            <a:pPr>
+              <a:spcBef>
+                <a:spcPts val="125"/>
+              </a:spcBef>
+            </a:pPr>
+            <a:r>
+              <a:rPr lang="en-GB" sz="2400" dirty="0">
+                <a:solidFill>
+                  <a:schemeClr val="bg1"/>
+                </a:solidFill>
+              </a:rPr>
+              <a:t>Fictitious case written by Richard Epstein.</a:t>
+            </a:r>
+          </a:p>
+          <a:p>
+            <a:pPr>
+              <a:spcBef>
+                <a:spcPts val="125"/>
+              </a:spcBef>
+            </a:pPr>
+            <a:r>
+              <a:rPr lang="en-GB" sz="2400" dirty="0">
+                <a:solidFill>
+                  <a:schemeClr val="bg1"/>
+                </a:solidFill>
+              </a:rPr>
+              <a:t>Presented as collection of news stories, reports, and interviews.</a:t>
+            </a:r>
+          </a:p>
+          <a:p>
+            <a:pPr>
+              <a:spcBef>
+                <a:spcPts val="125"/>
+              </a:spcBef>
+            </a:pPr>
+            <a:r>
+              <a:rPr lang="en-GB" sz="2400" dirty="0">
+                <a:solidFill>
+                  <a:schemeClr val="bg1"/>
+                </a:solidFill>
+              </a:rPr>
+              <a:t>Case includes aspects of computer ethics and software engineering.</a:t>
+            </a:r>
+          </a:p>
+          <a:p>
+            <a:pPr>
+              <a:spcBef>
+                <a:spcPts val="125"/>
+              </a:spcBef>
+            </a:pPr>
+            <a:r>
+              <a:rPr lang="en-GB" sz="2400" dirty="0">
+                <a:solidFill>
+                  <a:schemeClr val="bg1"/>
+                </a:solidFill>
+              </a:rPr>
+              <a:t>Talk about programmer psychology, teamwork, interfaces, software process models, and software testing.</a:t>
+            </a:r>
+            <a:endParaRPr lang="en-US" sz="2400" dirty="0">
+              <a:solidFill>
+                <a:schemeClr val="bg1"/>
+              </a:solidFill>
+            </a:endParaRPr>
           </a:p>
         </p:txBody>
       </p:sp>
@@ -9335,13 +9138,6 @@
   <p:clrMapOvr>
     <a:masterClrMapping/>
   </p:clrMapOvr>
-  <p:timing>
-    <p:tnLst>
-      <p:par>
-        <p:cTn id="1" dur="indefinite" restart="never" nodeType="tmRoot"/>
-      </p:par>
-    </p:tnLst>
-  </p:timing>
 </p:sld>
 </file>
 
@@ -10689,13 +10485,6 @@
   <p:clrMapOvr>
     <a:masterClrMapping/>
   </p:clrMapOvr>
-  <p:timing>
-    <p:tnLst>
-      <p:par>
-        <p:cTn id="1" dur="indefinite" restart="never" nodeType="tmRoot"/>
-      </p:par>
-    </p:tnLst>
-  </p:timing>
 </p:sld>
 </file>
 
@@ -10740,7 +10529,7 @@
           <a:p>
             <a:r>
               <a:rPr lang="en-US" sz="4400" dirty="0"/>
-              <a:t>Outline</a:t>
+              <a:t>Summary</a:t>
             </a:r>
           </a:p>
         </p:txBody>
@@ -10768,23 +10557,7 @@
                   <a:schemeClr val="bg1"/>
                 </a:solidFill>
               </a:rPr>
-              <a:t>Robbie CX30 malfunction </a:t>
-            </a:r>
-            <a:r>
-              <a:rPr lang="en-GB" sz="2400" dirty="0" smtClean="0">
-                <a:solidFill>
-                  <a:schemeClr val="bg1"/>
-                </a:solidFill>
-              </a:rPr>
-              <a:t>and killed </a:t>
-            </a:r>
-            <a:r>
-              <a:rPr lang="en-GB" sz="2400" dirty="0">
-                <a:solidFill>
-                  <a:schemeClr val="bg1"/>
-                </a:solidFill>
-              </a:rPr>
-              <a:t>B</a:t>
+              <a:t>Robbie CX30 malfunction and killed B</a:t>
             </a:r>
             <a:r>
               <a:rPr lang="en-US" sz="2400" dirty="0">
@@ -10857,13 +10630,6 @@
   <p:clrMapOvr>
     <a:masterClrMapping/>
   </p:clrMapOvr>
-  <p:timing>
-    <p:tnLst>
-      <p:par>
-        <p:cTn id="1" dur="indefinite" restart="never" nodeType="tmRoot"/>
-      </p:par>
-    </p:tnLst>
-  </p:timing>
 </p:sld>
 </file>
 
@@ -11227,13 +10993,6 @@
   <p:clrMapOvr>
     <a:masterClrMapping/>
   </p:clrMapOvr>
-  <p:timing>
-    <p:tnLst>
-      <p:par>
-        <p:cTn id="1" dur="indefinite" restart="never" nodeType="tmRoot"/>
-      </p:par>
-    </p:tnLst>
-  </p:timing>
 </p:sld>
 </file>
 
@@ -11294,18 +11053,13 @@
           <a:p>
             <a:pPr algn="r"/>
             <a:r>
-              <a:rPr lang="en-US" dirty="0" smtClean="0">
+              <a:rPr lang="en-US" dirty="0">
                 <a:solidFill>
                   <a:srgbClr val="4BACC6"/>
                 </a:solidFill>
               </a:rPr>
               <a:t>Culprits</a:t>
             </a:r>
-            <a:endParaRPr lang="en-US" dirty="0">
-              <a:solidFill>
-                <a:srgbClr val="4BACC6"/>
-              </a:solidFill>
-            </a:endParaRPr>
           </a:p>
         </p:txBody>
       </p:sp>
@@ -11430,20 +11184,12 @@
           <a:p>
             <a:pPr algn="ctr"/>
             <a:r>
-              <a:rPr lang="en-US" sz="1400" dirty="0" smtClean="0">
+              <a:rPr lang="en-US" sz="1400" dirty="0">
                 <a:solidFill>
                   <a:schemeClr val="bg1"/>
                 </a:solidFill>
               </a:rPr>
-              <a:t>1) Michael </a:t>
-            </a:r>
-            <a:r>
-              <a:rPr lang="en-US" sz="1400" dirty="0">
-                <a:solidFill>
-                  <a:schemeClr val="bg1"/>
-                </a:solidFill>
-              </a:rPr>
-              <a:t>Waterson</a:t>
+              <a:t>1) Michael Waterson</a:t>
             </a:r>
           </a:p>
           <a:p>
@@ -11490,20 +11236,12 @@
           <a:p>
             <a:pPr algn="ctr"/>
             <a:r>
-              <a:rPr lang="en-US" sz="1400" dirty="0" smtClean="0">
+              <a:rPr lang="en-US" sz="1400" dirty="0">
                 <a:solidFill>
                   <a:schemeClr val="bg1"/>
                 </a:solidFill>
               </a:rPr>
-              <a:t>3) Sam </a:t>
-            </a:r>
-            <a:r>
-              <a:rPr lang="en-US" sz="1400" dirty="0">
-                <a:solidFill>
-                  <a:schemeClr val="bg1"/>
-                </a:solidFill>
-              </a:rPr>
-              <a:t>Reynolds</a:t>
+              <a:t>3) Sam Reynolds</a:t>
             </a:r>
           </a:p>
           <a:p>
@@ -11517,7 +11255,7 @@
               <a:t>(CX30 </a:t>
             </a:r>
             <a:r>
-              <a:rPr lang="en-US" sz="1400" dirty="0" err="1" smtClean="0">
+              <a:rPr lang="en-US" sz="1400" dirty="0" err="1">
                 <a:solidFill>
                   <a:schemeClr val="bg1"/>
                 </a:solidFill>
@@ -11571,23 +11309,7 @@
                   <a:schemeClr val="bg1"/>
                 </a:solidFill>
               </a:rPr>
-              <a:t>5</a:t>
-            </a:r>
-            <a:r>
-              <a:rPr lang="en-US" sz="1400" dirty="0" smtClean="0">
-                <a:solidFill>
-                  <a:schemeClr val="bg1"/>
-                </a:solidFill>
-              </a:rPr>
-              <a:t>) Cindy </a:t>
-            </a:r>
-            <a:r>
-              <a:rPr lang="en-US" sz="1400" dirty="0">
-                <a:solidFill>
-                  <a:schemeClr val="bg1"/>
-                </a:solidFill>
-              </a:rPr>
-              <a:t>Yardley</a:t>
+              <a:t>5) Cindy Yardley</a:t>
             </a:r>
           </a:p>
           <a:p>
@@ -11634,20 +11356,12 @@
           <a:p>
             <a:pPr algn="ctr"/>
             <a:r>
-              <a:rPr lang="en-US" sz="1400" dirty="0" smtClean="0">
+              <a:rPr lang="en-US" sz="1400" dirty="0">
                 <a:solidFill>
                   <a:schemeClr val="bg1"/>
                 </a:solidFill>
               </a:rPr>
-              <a:t>2) Ray </a:t>
-            </a:r>
-            <a:r>
-              <a:rPr lang="en-US" sz="1400" dirty="0">
-                <a:solidFill>
-                  <a:schemeClr val="bg1"/>
-                </a:solidFill>
-              </a:rPr>
-              <a:t>Johnson</a:t>
+              <a:t>2) Ray Johnson</a:t>
             </a:r>
           </a:p>
           <a:p>
@@ -11694,20 +11408,12 @@
           <a:p>
             <a:pPr algn="ctr"/>
             <a:r>
-              <a:rPr lang="en-US" sz="1400" dirty="0" smtClean="0">
+              <a:rPr lang="en-US" sz="1400" dirty="0">
                 <a:solidFill>
                   <a:schemeClr val="bg1"/>
                 </a:solidFill>
               </a:rPr>
-              <a:t>4) Randy </a:t>
-            </a:r>
-            <a:r>
-              <a:rPr lang="en-US" sz="1400" dirty="0">
-                <a:solidFill>
-                  <a:schemeClr val="bg1"/>
-                </a:solidFill>
-              </a:rPr>
-              <a:t>Samuels</a:t>
+              <a:t>4) Randy Samuels</a:t>
             </a:r>
           </a:p>
           <a:p>
@@ -11760,20 +11466,12 @@
           <a:p>
             <a:pPr algn="ctr"/>
             <a:r>
-              <a:rPr lang="en-US" sz="1400" dirty="0" smtClean="0">
+              <a:rPr lang="en-US" sz="1400" dirty="0">
                 <a:solidFill>
                   <a:schemeClr val="bg1"/>
                 </a:solidFill>
               </a:rPr>
-              <a:t>6) Interface </a:t>
-            </a:r>
-            <a:r>
-              <a:rPr lang="en-US" sz="1400" dirty="0">
-                <a:solidFill>
-                  <a:schemeClr val="bg1"/>
-                </a:solidFill>
-              </a:rPr>
-              <a:t>designer</a:t>
+              <a:t>6) Interface designer</a:t>
             </a:r>
           </a:p>
           <a:p>
@@ -11916,13 +11614,6 @@
   <p:clrMapOvr>
     <a:masterClrMapping/>
   </p:clrMapOvr>
-  <p:timing>
-    <p:tnLst>
-      <p:par>
-        <p:cTn id="1" dur="indefinite" restart="never" nodeType="tmRoot"/>
-      </p:par>
-    </p:tnLst>
-  </p:timing>
 </p:sld>
 </file>
 
@@ -12018,18 +11709,13 @@
           <a:p>
             <a:pPr algn="just"/>
             <a:r>
-              <a:rPr lang="en-US" sz="2400" dirty="0" smtClean="0">
+              <a:rPr lang="en-US" sz="2400" dirty="0">
                 <a:solidFill>
                   <a:schemeClr val="bg1"/>
                 </a:solidFill>
               </a:rPr>
               <a:t>Randy programmed the Robbie CX30.</a:t>
             </a:r>
-            <a:endParaRPr lang="en-US" sz="2400" dirty="0">
-              <a:solidFill>
-                <a:schemeClr val="bg1"/>
-              </a:solidFill>
-            </a:endParaRPr>
           </a:p>
           <a:p>
             <a:pPr algn="just"/>
@@ -12039,61 +11725,19 @@
                   <a:schemeClr val="bg1"/>
                 </a:solidFill>
               </a:rPr>
-              <a:t>M</a:t>
-            </a:r>
-            <a:r>
-              <a:rPr lang="en-US" sz="2400" dirty="0" smtClean="0">
+              <a:t>Misread a handwritten formula for a robot's dynamic behavior</a:t>
+            </a:r>
+          </a:p>
+          <a:p>
+            <a:pPr algn="just"/>
+            <a:r>
+              <a:rPr lang="en-US" sz="2400" dirty="0">
                 <a:solidFill>
                   <a:schemeClr val="bg1"/>
                 </a:solidFill>
               </a:rPr>
-              <a:t>isread </a:t>
-            </a:r>
-            <a:r>
-              <a:rPr lang="en-US" sz="2400" dirty="0">
-                <a:solidFill>
-                  <a:schemeClr val="bg1"/>
-                </a:solidFill>
-              </a:rPr>
-              <a:t>a handwritten formula for a robot's dynamic </a:t>
-            </a:r>
-            <a:r>
-              <a:rPr lang="en-US" sz="2400" dirty="0" smtClean="0">
-                <a:solidFill>
-                  <a:schemeClr val="bg1"/>
-                </a:solidFill>
-              </a:rPr>
-              <a:t>behavior</a:t>
-            </a:r>
-            <a:endParaRPr lang="en-US" sz="2400" dirty="0">
-              <a:solidFill>
-                <a:schemeClr val="bg1"/>
-              </a:solidFill>
-            </a:endParaRPr>
-          </a:p>
-          <a:p>
-            <a:pPr algn="just"/>
-            <a:r>
-              <a:rPr lang="en-US" sz="2400" dirty="0">
-                <a:solidFill>
-                  <a:schemeClr val="bg1"/>
-                </a:solidFill>
-              </a:rPr>
-              <a:t>C</a:t>
-            </a:r>
-            <a:r>
-              <a:rPr lang="en-US" sz="2400" dirty="0" smtClean="0">
-                <a:solidFill>
-                  <a:schemeClr val="bg1"/>
-                </a:solidFill>
-              </a:rPr>
-              <a:t>ould not cooperate with teammates</a:t>
-            </a:r>
-            <a:endParaRPr lang="en-US" sz="2400" dirty="0">
-              <a:solidFill>
-                <a:schemeClr val="bg1"/>
-              </a:solidFill>
-            </a:endParaRPr>
+              <a:t>Could not cooperate with teammates</a:t>
+            </a:r>
           </a:p>
         </p:txBody>
       </p:sp>
@@ -12181,10 +11825,9 @@
           </a:lstStyle>
           <a:p>
             <a:r>
-              <a:rPr lang="en-US" dirty="0" smtClean="0"/>
+              <a:rPr lang="en-US" dirty="0"/>
               <a:t>Randy Samuels</a:t>
             </a:r>
-            <a:endParaRPr lang="en-US" dirty="0"/>
           </a:p>
         </p:txBody>
       </p:sp>
@@ -12421,7 +12064,7 @@
               <a:buNone/>
             </a:pPr>
             <a:r>
-              <a:rPr lang="en-US" sz="2400" dirty="0" smtClean="0">
+              <a:rPr lang="en-US" sz="2400" dirty="0">
                 <a:solidFill>
                   <a:schemeClr val="bg1"/>
                 </a:solidFill>
@@ -12431,7 +12074,7 @@
           </a:p>
           <a:p>
             <a:r>
-              <a:rPr lang="en-US" sz="2400" dirty="0" smtClean="0">
+              <a:rPr lang="en-US" sz="2400" dirty="0">
                 <a:solidFill>
                   <a:schemeClr val="bg1"/>
                 </a:solidFill>
@@ -12446,31 +12089,7 @@
                   <a:schemeClr val="bg1"/>
                 </a:solidFill>
               </a:rPr>
-              <a:t>2.4 </a:t>
-            </a:r>
-            <a:r>
-              <a:rPr lang="en-US" sz="2400" dirty="0" smtClean="0">
-                <a:solidFill>
-                  <a:schemeClr val="bg1"/>
-                </a:solidFill>
-              </a:rPr>
-              <a:t>Did </a:t>
-            </a:r>
-            <a:r>
-              <a:rPr lang="en-US" sz="2400" dirty="0">
-                <a:solidFill>
-                  <a:schemeClr val="bg1"/>
-                </a:solidFill>
-              </a:rPr>
-              <a:t>not respond well to </a:t>
-            </a:r>
-            <a:r>
-              <a:rPr lang="en-US" sz="2400" dirty="0" smtClean="0">
-                <a:solidFill>
-                  <a:schemeClr val="bg1"/>
-                </a:solidFill>
-              </a:rPr>
-              <a:t>      feedback</a:t>
+              <a:t>2.4 Did not respond well to       feedback</a:t>
             </a:r>
           </a:p>
         </p:txBody>
@@ -12711,7 +12330,7 @@
               <a:buNone/>
             </a:pPr>
             <a:r>
-              <a:rPr lang="en-US" sz="2400" dirty="0" smtClean="0">
+              <a:rPr lang="en-US" sz="2400" dirty="0">
                 <a:solidFill>
                   <a:schemeClr val="bg1"/>
                 </a:solidFill>
@@ -12731,48 +12350,16 @@
           </a:p>
           <a:p>
             <a:r>
-              <a:rPr lang="en-US" sz="2400" dirty="0" smtClean="0">
+              <a:rPr lang="en-US" sz="2400" dirty="0">
                 <a:solidFill>
                   <a:schemeClr val="bg1"/>
                 </a:solidFill>
               </a:rPr>
-              <a:t>2.e Did </a:t>
-            </a:r>
-            <a:r>
-              <a:rPr lang="en-US" sz="2400" dirty="0">
-                <a:solidFill>
-                  <a:schemeClr val="bg1"/>
-                </a:solidFill>
-              </a:rPr>
-              <a:t>not respond well to </a:t>
-            </a:r>
-            <a:r>
-              <a:rPr lang="en-US" sz="2400" dirty="0" smtClean="0">
-                <a:solidFill>
-                  <a:schemeClr val="bg1"/>
-                </a:solidFill>
-              </a:rPr>
-              <a:t> feedback </a:t>
-            </a:r>
-            <a:r>
-              <a:rPr lang="en-US" sz="2400" dirty="0">
-                <a:solidFill>
-                  <a:schemeClr val="bg1"/>
-                </a:solidFill>
-              </a:rPr>
-              <a:t>from </a:t>
-            </a:r>
-            <a:r>
-              <a:rPr lang="en-US" sz="2400" dirty="0" smtClean="0">
-                <a:solidFill>
-                  <a:schemeClr val="bg1"/>
-                </a:solidFill>
-              </a:rPr>
-              <a:t>peers</a:t>
-            </a:r>
-          </a:p>
-          <a:p>
-            <a:endParaRPr lang="en-US" sz="2400" dirty="0" smtClean="0">
+              <a:t>2.e Did not respond well to  feedback from peers</a:t>
+            </a:r>
+          </a:p>
+          <a:p>
+            <a:endParaRPr lang="en-US" sz="2400" dirty="0">
               <a:solidFill>
                 <a:schemeClr val="bg1"/>
               </a:solidFill>
@@ -12790,13 +12377,6 @@
   <p:clrMapOvr>
     <a:masterClrMapping/>
   </p:clrMapOvr>
-  <p:timing>
-    <p:tnLst>
-      <p:par>
-        <p:cTn id="1" dur="indefinite" restart="never" nodeType="tmRoot"/>
-      </p:par>
-    </p:tnLst>
-  </p:timing>
 </p:sld>
 </file>
 
@@ -13028,36 +12608,34 @@
                   <a:schemeClr val="bg1"/>
                 </a:solidFill>
               </a:rPr>
-              <a:t>Robotics Division chief at Silicon </a:t>
-            </a:r>
-            <a:r>
-              <a:rPr lang="en-US" sz="2400" dirty="0" smtClean="0">
+              <a:t>Robotics Division chief at Silicon Techtronic</a:t>
+            </a:r>
+          </a:p>
+          <a:p>
+            <a:pPr algn="just"/>
+            <a:r>
+              <a:rPr lang="en-US" sz="2400" dirty="0">
                 <a:solidFill>
                   <a:schemeClr val="bg1"/>
                 </a:solidFill>
               </a:rPr>
-              <a:t>Techtronic</a:t>
+              <a:t>Bringing an emotional or personal conflict into a work setting (Sam Reynolds)</a:t>
             </a:r>
           </a:p>
           <a:p>
             <a:pPr algn="just"/>
             <a:r>
-              <a:rPr lang="en-US" sz="2400" dirty="0" smtClean="0">
+              <a:rPr lang="en-US" sz="2400" dirty="0">
                 <a:solidFill>
                   <a:schemeClr val="bg1"/>
                 </a:solidFill>
               </a:rPr>
-              <a:t>Bringing </a:t>
-            </a:r>
-            <a:r>
-              <a:rPr lang="en-US" sz="2400" dirty="0">
-                <a:solidFill>
-                  <a:schemeClr val="bg1"/>
-                </a:solidFill>
-              </a:rPr>
-              <a:t>an emotional or personal conflict into a work setting (Sam Reynolds)</a:t>
-            </a:r>
-            <a:endParaRPr lang="en-US" sz="2400" dirty="0" smtClean="0">
+              <a:t>Placing a lot of pressure on the team</a:t>
+            </a:r>
+          </a:p>
+          <a:p>
+            <a:pPr algn="just"/>
+            <a:endParaRPr lang="en-US" sz="2400" dirty="0">
               <a:solidFill>
                 <a:schemeClr val="bg1"/>
               </a:solidFill>
@@ -13065,26 +12643,7 @@
           </a:p>
           <a:p>
             <a:pPr algn="just"/>
-            <a:r>
-              <a:rPr lang="en-US" sz="2400" dirty="0">
-                <a:solidFill>
-                  <a:schemeClr val="bg1"/>
-                </a:solidFill>
-              </a:rPr>
-              <a:t>Placing a lot of pressure on the </a:t>
-            </a:r>
-            <a:r>
-              <a:rPr lang="en-US" sz="2400" dirty="0" smtClean="0">
-                <a:solidFill>
-                  <a:schemeClr val="bg1"/>
-                </a:solidFill>
-              </a:rPr>
-              <a:t>team</a:t>
-            </a:r>
-          </a:p>
-          <a:p>
-            <a:pPr algn="just"/>
-            <a:endParaRPr lang="en-US" sz="2400" dirty="0" smtClean="0">
+            <a:endParaRPr lang="en-US" sz="2400" dirty="0">
               <a:solidFill>
                 <a:schemeClr val="bg1"/>
               </a:solidFill>
@@ -13092,15 +12651,7 @@
           </a:p>
           <a:p>
             <a:pPr algn="just"/>
-            <a:endParaRPr lang="en-US" sz="2400" dirty="0" smtClean="0">
-              <a:solidFill>
-                <a:schemeClr val="bg1"/>
-              </a:solidFill>
-            </a:endParaRPr>
-          </a:p>
-          <a:p>
-            <a:pPr algn="just"/>
-            <a:endParaRPr lang="en-US" sz="2400" dirty="0" smtClean="0">
+            <a:endParaRPr lang="en-US" sz="2400" dirty="0">
               <a:solidFill>
                 <a:schemeClr val="bg1"/>
               </a:solidFill>
@@ -13162,10 +12713,9 @@
           </a:lstStyle>
           <a:p>
             <a:r>
-              <a:rPr lang="en-US" dirty="0" smtClean="0"/>
+              <a:rPr lang="en-US" dirty="0"/>
               <a:t>Ray Johnson</a:t>
             </a:r>
-            <a:endParaRPr lang="en-US" dirty="0"/>
           </a:p>
         </p:txBody>
       </p:sp>
@@ -13448,7 +12998,7 @@
               <a:buNone/>
             </a:pPr>
             <a:r>
-              <a:rPr lang="en-US" sz="2400" dirty="0" smtClean="0">
+              <a:rPr lang="en-US" sz="2400" dirty="0">
                 <a:solidFill>
                   <a:schemeClr val="bg1"/>
                 </a:solidFill>
@@ -13463,55 +13013,18 @@
                   <a:schemeClr val="bg1"/>
                 </a:solidFill>
               </a:rPr>
-              <a:t>1.a </a:t>
-            </a:r>
-            <a:r>
-              <a:rPr lang="en-US" sz="2400" dirty="0" smtClean="0">
+              <a:t>1.a failed to consider public safety</a:t>
+            </a:r>
+          </a:p>
+          <a:p>
+            <a:r>
+              <a:rPr lang="en-US" sz="2400" dirty="0">
                 <a:solidFill>
                   <a:schemeClr val="bg1"/>
                 </a:solidFill>
               </a:rPr>
-              <a:t>failed </a:t>
-            </a:r>
-            <a:r>
-              <a:rPr lang="en-US" sz="2400" dirty="0">
-                <a:solidFill>
-                  <a:schemeClr val="bg1"/>
-                </a:solidFill>
-              </a:rPr>
-              <a:t>to consider public </a:t>
-            </a:r>
-            <a:r>
-              <a:rPr lang="en-US" sz="2400" dirty="0" smtClean="0">
-                <a:solidFill>
-                  <a:schemeClr val="bg1"/>
-                </a:solidFill>
-              </a:rPr>
-              <a:t>safety</a:t>
-            </a:r>
-          </a:p>
-          <a:p>
-            <a:r>
-              <a:rPr lang="en-US" sz="2400" dirty="0" smtClean="0">
-                <a:solidFill>
-                  <a:schemeClr val="bg1"/>
-                </a:solidFill>
-              </a:rPr>
-              <a:t>3.e </a:t>
-            </a:r>
-            <a:r>
-              <a:rPr lang="en-US" sz="2400" dirty="0">
-                <a:solidFill>
-                  <a:schemeClr val="bg1"/>
-                </a:solidFill>
-              </a:rPr>
-              <a:t>He falsely claimed that his product was error-free</a:t>
-            </a:r>
-            <a:endParaRPr lang="en-US" sz="2400" dirty="0" smtClean="0">
-              <a:solidFill>
-                <a:schemeClr val="bg1"/>
-              </a:solidFill>
-            </a:endParaRPr>
+              <a:t>3.e He falsely claimed that his product was error-free</a:t>
+            </a:r>
           </a:p>
         </p:txBody>
       </p:sp>
@@ -13751,7 +13264,7 @@
               <a:buNone/>
             </a:pPr>
             <a:r>
-              <a:rPr lang="en-US" sz="2400" dirty="0" smtClean="0">
+              <a:rPr lang="en-US" sz="2400" dirty="0">
                 <a:solidFill>
                   <a:schemeClr val="bg1"/>
                 </a:solidFill>
@@ -13761,63 +13274,26 @@
           </a:p>
           <a:p>
             <a:r>
-              <a:rPr lang="en-US" sz="2400" dirty="0" smtClean="0">
+              <a:rPr lang="en-US" sz="2400" dirty="0">
                 <a:solidFill>
                   <a:schemeClr val="bg1"/>
                 </a:solidFill>
               </a:rPr>
-              <a:t>2.1 Encouraged </a:t>
-            </a:r>
+              <a:t>2.1 Encouraged his subordinates to take shortcuts</a:t>
+            </a:r>
+          </a:p>
+          <a:p>
             <a:r>
               <a:rPr lang="en-US" sz="2400" dirty="0">
                 <a:solidFill>
                   <a:schemeClr val="bg1"/>
                 </a:solidFill>
               </a:rPr>
-              <a:t>his subordinates to take </a:t>
-            </a:r>
-            <a:r>
-              <a:rPr lang="en-US" sz="2400" dirty="0" smtClean="0">
-                <a:solidFill>
-                  <a:schemeClr val="bg1"/>
-                </a:solidFill>
-              </a:rPr>
-              <a:t>shortcuts</a:t>
-            </a:r>
+              <a:t>2.5 Used risky solutions</a:t>
+            </a:r>
+          </a:p>
+          <a:p>
             <a:endParaRPr lang="en-US" sz="2400" dirty="0">
-              <a:solidFill>
-                <a:schemeClr val="bg1"/>
-              </a:solidFill>
-            </a:endParaRPr>
-          </a:p>
-          <a:p>
-            <a:r>
-              <a:rPr lang="en-US" sz="2400" dirty="0" smtClean="0">
-                <a:solidFill>
-                  <a:schemeClr val="bg1"/>
-                </a:solidFill>
-              </a:rPr>
-              <a:t>2.5 Used </a:t>
-            </a:r>
-            <a:r>
-              <a:rPr lang="en-US" sz="2400" dirty="0">
-                <a:solidFill>
-                  <a:schemeClr val="bg1"/>
-                </a:solidFill>
-              </a:rPr>
-              <a:t>risky </a:t>
-            </a:r>
-            <a:r>
-              <a:rPr lang="en-US" sz="2400" dirty="0" smtClean="0">
-                <a:solidFill>
-                  <a:schemeClr val="bg1"/>
-                </a:solidFill>
-              </a:rPr>
-              <a:t>solutions</a:t>
-            </a:r>
-          </a:p>
-          <a:p>
-            <a:endParaRPr lang="en-US" sz="2400" dirty="0" smtClean="0">
               <a:solidFill>
                 <a:schemeClr val="bg1"/>
               </a:solidFill>
@@ -13835,13 +13311,6 @@
   <p:clrMapOvr>
     <a:masterClrMapping/>
   </p:clrMapOvr>
-  <p:timing>
-    <p:tnLst>
-      <p:par>
-        <p:cTn id="1" dur="indefinite" restart="never" nodeType="tmRoot"/>
-      </p:par>
-    </p:tnLst>
-  </p:timing>
 </p:sld>
 </file>
 
@@ -13908,10 +13377,9 @@
           </a:lstStyle>
           <a:p>
             <a:r>
-              <a:rPr lang="en-US" dirty="0" smtClean="0"/>
+              <a:rPr lang="en-US" dirty="0"/>
               <a:t>Sam Reynolds</a:t>
             </a:r>
-            <a:endParaRPr lang="en-US" dirty="0"/>
           </a:p>
         </p:txBody>
       </p:sp>
@@ -14007,7 +13475,7 @@
               <a:buFont typeface="Arial" panose="020B0604020202020204" pitchFamily="34" charset="0"/>
               <a:buChar char="•"/>
             </a:pPr>
-            <a:endParaRPr lang="en-US" sz="2400" dirty="0" smtClean="0">
+            <a:endParaRPr lang="en-US" sz="2400" dirty="0">
               <a:latin typeface="+mn-lt"/>
             </a:endParaRPr>
           </a:p>
@@ -14016,126 +13484,6 @@
               <a:buFont typeface="Arial" panose="020B0604020202020204" pitchFamily="34" charset="0"/>
               <a:buChar char="•"/>
             </a:pPr>
-            <a:endParaRPr lang="en-US" sz="2400" dirty="0" smtClean="0">
-              <a:solidFill>
-                <a:schemeClr val="bg1"/>
-              </a:solidFill>
-              <a:latin typeface="+mn-lt"/>
-            </a:endParaRPr>
-          </a:p>
-          <a:p>
-            <a:pPr marL="342900" indent="-342900" algn="l">
-              <a:lnSpc>
-                <a:spcPct val="120000"/>
-              </a:lnSpc>
-              <a:buFont typeface="Arial" panose="020B0604020202020204" pitchFamily="34" charset="0"/>
-              <a:buChar char="•"/>
-            </a:pPr>
-            <a:endParaRPr lang="en-US" sz="2400" dirty="0" smtClean="0">
-              <a:solidFill>
-                <a:schemeClr val="bg1"/>
-              </a:solidFill>
-              <a:latin typeface="+mn-lt"/>
-            </a:endParaRPr>
-          </a:p>
-          <a:p>
-            <a:pPr marL="342900" indent="-342900" algn="l">
-              <a:lnSpc>
-                <a:spcPct val="120000"/>
-              </a:lnSpc>
-              <a:buFont typeface="Arial" panose="020B0604020202020204" pitchFamily="34" charset="0"/>
-              <a:buChar char="•"/>
-            </a:pPr>
-            <a:r>
-              <a:rPr lang="en-US" sz="2400" dirty="0" smtClean="0">
-                <a:solidFill>
-                  <a:schemeClr val="bg1"/>
-                </a:solidFill>
-                <a:latin typeface="+mn-lt"/>
-              </a:rPr>
-              <a:t>CX30 </a:t>
-            </a:r>
-            <a:r>
-              <a:rPr lang="en-US" sz="2400" dirty="0">
-                <a:solidFill>
-                  <a:schemeClr val="bg1"/>
-                </a:solidFill>
-                <a:latin typeface="+mn-lt"/>
-              </a:rPr>
-              <a:t>project manager (made by CEO </a:t>
-            </a:r>
-            <a:r>
-              <a:rPr lang="en-US" sz="2400" dirty="0" smtClean="0">
-                <a:solidFill>
-                  <a:schemeClr val="bg1"/>
-                </a:solidFill>
-                <a:latin typeface="+mn-lt"/>
-              </a:rPr>
-              <a:t>Michael)</a:t>
-            </a:r>
-          </a:p>
-          <a:p>
-            <a:pPr marL="342900" indent="-342900" algn="l">
-              <a:lnSpc>
-                <a:spcPct val="120000"/>
-              </a:lnSpc>
-              <a:buFont typeface="Arial" panose="020B0604020202020204" pitchFamily="34" charset="0"/>
-              <a:buChar char="•"/>
-            </a:pPr>
-            <a:r>
-              <a:rPr lang="en-US" sz="2400" dirty="0">
-                <a:solidFill>
-                  <a:schemeClr val="bg1"/>
-                </a:solidFill>
-                <a:latin typeface="+mn-lt"/>
-              </a:rPr>
-              <a:t>F</a:t>
-            </a:r>
-            <a:r>
-              <a:rPr lang="en-US" sz="2400" dirty="0" smtClean="0">
-                <a:solidFill>
-                  <a:schemeClr val="bg1"/>
-                </a:solidFill>
-                <a:latin typeface="+mn-lt"/>
-              </a:rPr>
-              <a:t>orced the waterfall model to be used rather than the robot-friendly prototype model</a:t>
-            </a:r>
-          </a:p>
-          <a:p>
-            <a:pPr marL="342900" indent="-342900" algn="l">
-              <a:lnSpc>
-                <a:spcPct val="120000"/>
-              </a:lnSpc>
-              <a:buFont typeface="Arial" panose="020B0604020202020204" pitchFamily="34" charset="0"/>
-              <a:buChar char="•"/>
-            </a:pPr>
-            <a:r>
-              <a:rPr lang="en-US" sz="2400" dirty="0" smtClean="0">
-                <a:solidFill>
-                  <a:schemeClr val="bg1"/>
-                </a:solidFill>
-                <a:latin typeface="+mn-lt"/>
-              </a:rPr>
-              <a:t>Lack </a:t>
-            </a:r>
-            <a:r>
-              <a:rPr lang="en-US" sz="2400" dirty="0">
-                <a:solidFill>
-                  <a:schemeClr val="bg1"/>
-                </a:solidFill>
-                <a:latin typeface="+mn-lt"/>
-              </a:rPr>
-              <a:t>of communication with </a:t>
-            </a:r>
-            <a:r>
-              <a:rPr lang="en-US" sz="2400" dirty="0" smtClean="0">
-                <a:solidFill>
-                  <a:schemeClr val="bg1"/>
-                </a:solidFill>
-                <a:latin typeface="+mn-lt"/>
-              </a:rPr>
-              <a:t>Ray</a:t>
-            </a:r>
             <a:endParaRPr lang="en-US" sz="2400" dirty="0">
               <a:solidFill>
                 <a:schemeClr val="bg1"/>
@@ -14144,10 +13492,73 @@
             </a:endParaRPr>
           </a:p>
           <a:p>
-            <a:pPr algn="l"/>
-            <a:endParaRPr lang="en-US" sz="2400" dirty="0" smtClean="0">
+            <a:pPr marL="342900" indent="-342900" algn="l">
+              <a:lnSpc>
+                <a:spcPct val="120000"/>
+              </a:lnSpc>
+              <a:buFont typeface="Arial" panose="020B0604020202020204" pitchFamily="34" charset="0"/>
+              <a:buChar char="•"/>
+            </a:pPr>
+            <a:endParaRPr lang="en-US" sz="2400" dirty="0">
+              <a:solidFill>
+                <a:schemeClr val="bg1"/>
+              </a:solidFill>
               <a:latin typeface="+mn-lt"/>
             </a:endParaRPr>
+          </a:p>
+          <a:p>
+            <a:pPr marL="342900" indent="-342900" algn="l">
+              <a:lnSpc>
+                <a:spcPct val="120000"/>
+              </a:lnSpc>
+              <a:buFont typeface="Arial" panose="020B0604020202020204" pitchFamily="34" charset="0"/>
+              <a:buChar char="•"/>
+            </a:pPr>
+            <a:r>
+              <a:rPr lang="en-US" sz="2400" dirty="0">
+                <a:solidFill>
+                  <a:schemeClr val="bg1"/>
+                </a:solidFill>
+                <a:latin typeface="+mn-lt"/>
+              </a:rPr>
+              <a:t>CX30 project manager (made by CEO Michael)</a:t>
+            </a:r>
+          </a:p>
+          <a:p>
+            <a:pPr marL="342900" indent="-342900" algn="l">
+              <a:lnSpc>
+                <a:spcPct val="120000"/>
+              </a:lnSpc>
+              <a:buFont typeface="Arial" panose="020B0604020202020204" pitchFamily="34" charset="0"/>
+              <a:buChar char="•"/>
+            </a:pPr>
+            <a:r>
+              <a:rPr lang="en-US" sz="2400" dirty="0">
+                <a:solidFill>
+                  <a:schemeClr val="bg1"/>
+                </a:solidFill>
+                <a:latin typeface="+mn-lt"/>
+              </a:rPr>
+              <a:t>Forced the waterfall model to be used rather than the robot-friendly prototype model</a:t>
+            </a:r>
+          </a:p>
+          <a:p>
+            <a:pPr marL="342900" indent="-342900" algn="l">
+              <a:lnSpc>
+                <a:spcPct val="120000"/>
+              </a:lnSpc>
+              <a:buFont typeface="Arial" panose="020B0604020202020204" pitchFamily="34" charset="0"/>
+              <a:buChar char="•"/>
+            </a:pPr>
+            <a:r>
+              <a:rPr lang="en-US" sz="2400" dirty="0">
+                <a:solidFill>
+                  <a:schemeClr val="bg1"/>
+                </a:solidFill>
+                <a:latin typeface="+mn-lt"/>
+              </a:rPr>
+              <a:t>Lack of communication with Ray</a:t>
+            </a:r>
           </a:p>
           <a:p>
             <a:pPr algn="l"/>
@@ -14157,7 +13568,13 @@
           </a:p>
           <a:p>
             <a:pPr algn="l"/>
-            <a:endParaRPr lang="en-US" sz="2400" dirty="0" smtClean="0">
+            <a:endParaRPr lang="en-US" sz="2400" dirty="0">
+              <a:latin typeface="+mn-lt"/>
+            </a:endParaRPr>
+          </a:p>
+          <a:p>
+            <a:pPr algn="l"/>
+            <a:endParaRPr lang="en-US" sz="2400" dirty="0">
               <a:latin typeface="+mn-lt"/>
             </a:endParaRPr>
           </a:p>
@@ -14270,50 +13687,13 @@
               <a:buChar char="•"/>
             </a:pPr>
             <a:r>
-              <a:rPr lang="en-US" sz="2400" dirty="0" smtClean="0">
+              <a:rPr lang="en-US" sz="2400" dirty="0">
                 <a:solidFill>
                   <a:schemeClr val="bg1"/>
                 </a:solidFill>
               </a:rPr>
-              <a:t>2.6 accepted </a:t>
-            </a:r>
-            <a:r>
-              <a:rPr lang="en-US" sz="2400" dirty="0">
-                <a:solidFill>
-                  <a:schemeClr val="bg1"/>
-                </a:solidFill>
-              </a:rPr>
-              <a:t>a </a:t>
-            </a:r>
-            <a:r>
-              <a:rPr lang="en-US" sz="2400" dirty="0" smtClean="0">
-                <a:solidFill>
-                  <a:schemeClr val="bg1"/>
-                </a:solidFill>
-              </a:rPr>
-              <a:t>work </a:t>
-            </a:r>
-            <a:r>
-              <a:rPr lang="en-US" sz="2400" dirty="0">
-                <a:solidFill>
-                  <a:schemeClr val="bg1"/>
-                </a:solidFill>
-              </a:rPr>
-              <a:t>for which he was </a:t>
-            </a:r>
-            <a:r>
-              <a:rPr lang="en-US" sz="2400" dirty="0" smtClean="0">
-                <a:solidFill>
-                  <a:schemeClr val="bg1"/>
-                </a:solidFill>
-              </a:rPr>
-              <a:t>ineligible</a:t>
-            </a:r>
-            <a:endParaRPr lang="en-US" sz="2400" dirty="0">
-              <a:solidFill>
-                <a:schemeClr val="bg1"/>
-              </a:solidFill>
-            </a:endParaRPr>
+              <a:t>2.6 accepted a work for which he was ineligible</a:t>
+            </a:r>
           </a:p>
         </p:txBody>
       </p:sp>
@@ -14398,16 +13778,7 @@
                 </a:solidFill>
                 <a:latin typeface="+mn-lt"/>
               </a:rPr>
-              <a:t>Against BCS </a:t>
-            </a:r>
-            <a:r>
-              <a:rPr lang="en-US" sz="2400" dirty="0" smtClean="0">
-                <a:solidFill>
-                  <a:schemeClr val="bg1"/>
-                </a:solidFill>
-                <a:latin typeface="+mn-lt"/>
-              </a:rPr>
-              <a:t>Code</a:t>
+              <a:t>Against BCS Code</a:t>
             </a:r>
           </a:p>
           <a:p>
@@ -14422,34 +13793,7 @@
                 </a:solidFill>
                 <a:latin typeface="+mn-lt"/>
               </a:rPr>
-              <a:t>2.e </a:t>
-            </a:r>
-            <a:r>
-              <a:rPr lang="en-US" sz="2400" dirty="0" smtClean="0">
-                <a:solidFill>
-                  <a:schemeClr val="bg1"/>
-                </a:solidFill>
-                <a:latin typeface="+mn-lt"/>
-              </a:rPr>
-              <a:t>He </a:t>
-            </a:r>
-            <a:r>
-              <a:rPr lang="en-US" sz="2400" dirty="0">
-                <a:solidFill>
-                  <a:schemeClr val="bg1"/>
-                </a:solidFill>
-                <a:latin typeface="+mn-lt"/>
-              </a:rPr>
-              <a:t>rejected criticism and </a:t>
-            </a:r>
-            <a:r>
-              <a:rPr lang="en-US" sz="2400" dirty="0" smtClean="0">
-                <a:solidFill>
-                  <a:schemeClr val="bg1"/>
-                </a:solidFill>
-                <a:latin typeface="+mn-lt"/>
-              </a:rPr>
-              <a:t>opposing views </a:t>
+              <a:t>2.e He rejected criticism and opposing views </a:t>
             </a:r>
           </a:p>
           <a:p>
@@ -14464,23 +13808,8 @@
                 </a:solidFill>
                 <a:latin typeface="+mn-lt"/>
               </a:rPr>
-              <a:t>3.a Unauthorized usage of </a:t>
-            </a:r>
-            <a:r>
-              <a:rPr lang="en-US" sz="2400" dirty="0" smtClean="0">
-                <a:solidFill>
-                  <a:schemeClr val="bg1"/>
-                </a:solidFill>
-                <a:latin typeface="+mn-lt"/>
-              </a:rPr>
-              <a:t>power</a:t>
-            </a:r>
-            <a:endParaRPr lang="en-US" sz="2400" dirty="0">
-              <a:solidFill>
-                <a:schemeClr val="bg1"/>
-              </a:solidFill>
-              <a:latin typeface="+mn-lt"/>
-            </a:endParaRPr>
+              <a:t>3.a Unauthorized usage of power</a:t>
+            </a:r>
           </a:p>
         </p:txBody>
       </p:sp>
@@ -14532,13 +13861,6 @@
   <p:clrMapOvr>
     <a:masterClrMapping/>
   </p:clrMapOvr>
-  <p:timing>
-    <p:tnLst>
-      <p:par>
-        <p:cTn id="1" dur="indefinite" restart="never" nodeType="tmRoot"/>
-      </p:par>
-    </p:tnLst>
-  </p:timing>
 </p:sld>
 </file>
 

</xml_diff>